<commit_message>
presentation has been modified_1.
</commit_message>
<xml_diff>
--- a/documentation/Presentation.pptx
+++ b/documentation/Presentation.pptx
@@ -15437,8 +15437,8 @@
           <p:nvPr/>
         </p:nvGraphicFramePr>
         <p:xfrm>
-          <a:off x="1277938" y="142875"/>
-          <a:ext cx="6335712" cy="6842125"/>
+          <a:off x="1727684" y="548680"/>
+          <a:ext cx="5597934" cy="6045377"/>
         </p:xfrm>
         <a:graphic>
           <a:graphicData uri="http://schemas.openxmlformats.org/presentationml/2006/ole">
@@ -16004,8 +16004,8 @@
           <p:nvPr/>
         </p:nvGraphicFramePr>
         <p:xfrm>
-          <a:off x="-138113" y="334963"/>
-          <a:ext cx="9313863" cy="2827337"/>
+          <a:off x="0" y="512677"/>
+          <a:ext cx="9144000" cy="2556284"/>
         </p:xfrm>
         <a:graphic>
           <a:graphicData uri="http://schemas.openxmlformats.org/presentationml/2006/ole">

</xml_diff>